<commit_message>
Update Figure 16 Linked Things
</commit_message>
<xml_diff>
--- a/images/architecture/arch-cr.pptx
+++ b/images/architecture/arch-cr.pptx
@@ -125,6 +125,627 @@
 </p:presentation>
 </file>
 
+<file path=ppt/revisionInfo.xml><?xml version="1.0" encoding="utf-8"?>
+<p1510:revInfo xmlns:a="http://schemas.openxmlformats.org/drawingml/2006/main" xmlns:r="http://schemas.openxmlformats.org/officeDocument/2006/relationships" xmlns:p1510="http://schemas.microsoft.com/office/powerpoint/2015/10/main">
+  <p1510:revLst>
+    <p1510:client id="{1CA7E2A5-2B7D-45C5-BA10-5E9CF6D22FEF}" v="9" dt="2019-04-25T01:11:01.953"/>
+    <p1510:client id="{92752F1B-DB06-4D67-9EB8-372D3E76C027}" v="4" dt="2019-04-25T10:00:26.557"/>
+  </p1510:revLst>
+</p1510:revInfo>
+</file>
+
+<file path=ppt/changesInfos/changesInfo1.xml><?xml version="1.0" encoding="utf-8"?>
+<pc:chgInfo xmlns:a="http://schemas.openxmlformats.org/drawingml/2006/main" xmlns:r="http://schemas.openxmlformats.org/officeDocument/2006/relationships" xmlns:ac="http://schemas.microsoft.com/office/drawing/2013/main/command" xmlns:pc="http://schemas.microsoft.com/office/powerpoint/2013/main/command">
+  <pc:docChgLst>
+    <pc:chgData name="東村邦彦 / TOUMURA，KUNIHIKO" userId="aa80352f-8581-4c8d-8917-6e2824d17308" providerId="ADAL" clId="{1CA7E2A5-2B7D-45C5-BA10-5E9CF6D22FEF}"/>
+    <pc:docChg chg="modSld">
+      <pc:chgData name="東村邦彦 / TOUMURA，KUNIHIKO" userId="aa80352f-8581-4c8d-8917-6e2824d17308" providerId="ADAL" clId="{1CA7E2A5-2B7D-45C5-BA10-5E9CF6D22FEF}" dt="2019-04-25T01:11:50.753" v="41" actId="14100"/>
+      <pc:docMkLst>
+        <pc:docMk/>
+      </pc:docMkLst>
+      <pc:sldChg chg="addSp delSp modSp">
+        <pc:chgData name="東村邦彦 / TOUMURA，KUNIHIKO" userId="aa80352f-8581-4c8d-8917-6e2824d17308" providerId="ADAL" clId="{1CA7E2A5-2B7D-45C5-BA10-5E9CF6D22FEF}" dt="2019-04-25T01:11:50.753" v="41" actId="14100"/>
+        <pc:sldMkLst>
+          <pc:docMk/>
+          <pc:sldMk cId="2999952593" sldId="258"/>
+        </pc:sldMkLst>
+        <pc:spChg chg="mod topLvl">
+          <ac:chgData name="東村邦彦 / TOUMURA，KUNIHIKO" userId="aa80352f-8581-4c8d-8917-6e2824d17308" providerId="ADAL" clId="{1CA7E2A5-2B7D-45C5-BA10-5E9CF6D22FEF}" dt="2019-04-25T01:11:01.953" v="38" actId="164"/>
+          <ac:spMkLst>
+            <pc:docMk/>
+            <pc:sldMk cId="2999952593" sldId="258"/>
+            <ac:spMk id="4" creationId="{529EACCC-C218-4181-AB85-88A152772189}"/>
+          </ac:spMkLst>
+        </pc:spChg>
+        <pc:spChg chg="mod topLvl">
+          <ac:chgData name="東村邦彦 / TOUMURA，KUNIHIKO" userId="aa80352f-8581-4c8d-8917-6e2824d17308" providerId="ADAL" clId="{1CA7E2A5-2B7D-45C5-BA10-5E9CF6D22FEF}" dt="2019-04-25T01:11:01.953" v="38" actId="164"/>
+          <ac:spMkLst>
+            <pc:docMk/>
+            <pc:sldMk cId="2999952593" sldId="258"/>
+            <ac:spMk id="41" creationId="{7D117D8E-F664-4207-A0BE-A36DBAF3959A}"/>
+          </ac:spMkLst>
+        </pc:spChg>
+        <pc:spChg chg="add mod">
+          <ac:chgData name="東村邦彦 / TOUMURA，KUNIHIKO" userId="aa80352f-8581-4c8d-8917-6e2824d17308" providerId="ADAL" clId="{1CA7E2A5-2B7D-45C5-BA10-5E9CF6D22FEF}" dt="2019-04-25T01:11:35.274" v="40" actId="1076"/>
+          <ac:spMkLst>
+            <pc:docMk/>
+            <pc:sldMk cId="2999952593" sldId="258"/>
+            <ac:spMk id="47" creationId="{286BA5D7-ADFF-4092-9C52-8D7D5BBA0127}"/>
+          </ac:spMkLst>
+        </pc:spChg>
+        <pc:spChg chg="add del">
+          <ac:chgData name="東村邦彦 / TOUMURA，KUNIHIKO" userId="aa80352f-8581-4c8d-8917-6e2824d17308" providerId="ADAL" clId="{1CA7E2A5-2B7D-45C5-BA10-5E9CF6D22FEF}" dt="2019-04-25T00:30:09.640" v="1"/>
+          <ac:spMkLst>
+            <pc:docMk/>
+            <pc:sldMk cId="2999952593" sldId="258"/>
+            <ac:spMk id="47" creationId="{AB5B344F-9C06-444F-978C-511B5DE2AA8B}"/>
+          </ac:spMkLst>
+        </pc:spChg>
+        <pc:spChg chg="mod topLvl">
+          <ac:chgData name="東村邦彦 / TOUMURA，KUNIHIKO" userId="aa80352f-8581-4c8d-8917-6e2824d17308" providerId="ADAL" clId="{1CA7E2A5-2B7D-45C5-BA10-5E9CF6D22FEF}" dt="2019-04-25T01:11:01.953" v="38" actId="164"/>
+          <ac:spMkLst>
+            <pc:docMk/>
+            <pc:sldMk cId="2999952593" sldId="258"/>
+            <ac:spMk id="54" creationId="{DF0A1329-0B41-49D4-90D5-70946F050AAD}"/>
+          </ac:spMkLst>
+        </pc:spChg>
+        <pc:spChg chg="mod topLvl">
+          <ac:chgData name="東村邦彦 / TOUMURA，KUNIHIKO" userId="aa80352f-8581-4c8d-8917-6e2824d17308" providerId="ADAL" clId="{1CA7E2A5-2B7D-45C5-BA10-5E9CF6D22FEF}" dt="2019-04-25T01:11:01.953" v="38" actId="164"/>
+          <ac:spMkLst>
+            <pc:docMk/>
+            <pc:sldMk cId="2999952593" sldId="258"/>
+            <ac:spMk id="55" creationId="{0537BC9F-7751-4EB4-B6C2-0E4A7730EDF0}"/>
+          </ac:spMkLst>
+        </pc:spChg>
+        <pc:spChg chg="mod topLvl">
+          <ac:chgData name="東村邦彦 / TOUMURA，KUNIHIKO" userId="aa80352f-8581-4c8d-8917-6e2824d17308" providerId="ADAL" clId="{1CA7E2A5-2B7D-45C5-BA10-5E9CF6D22FEF}" dt="2019-04-25T01:11:01.953" v="38" actId="164"/>
+          <ac:spMkLst>
+            <pc:docMk/>
+            <pc:sldMk cId="2999952593" sldId="258"/>
+            <ac:spMk id="87" creationId="{940FE31F-5355-4155-B7B3-79D4EAC17461}"/>
+          </ac:spMkLst>
+        </pc:spChg>
+        <pc:spChg chg="mod topLvl">
+          <ac:chgData name="東村邦彦 / TOUMURA，KUNIHIKO" userId="aa80352f-8581-4c8d-8917-6e2824d17308" providerId="ADAL" clId="{1CA7E2A5-2B7D-45C5-BA10-5E9CF6D22FEF}" dt="2019-04-25T01:11:01.953" v="38" actId="164"/>
+          <ac:spMkLst>
+            <pc:docMk/>
+            <pc:sldMk cId="2999952593" sldId="258"/>
+            <ac:spMk id="89" creationId="{C3343050-8CC9-4B75-B876-F2F33E35216C}"/>
+          </ac:spMkLst>
+        </pc:spChg>
+        <pc:spChg chg="mod topLvl">
+          <ac:chgData name="東村邦彦 / TOUMURA，KUNIHIKO" userId="aa80352f-8581-4c8d-8917-6e2824d17308" providerId="ADAL" clId="{1CA7E2A5-2B7D-45C5-BA10-5E9CF6D22FEF}" dt="2019-04-25T01:11:01.953" v="38" actId="164"/>
+          <ac:spMkLst>
+            <pc:docMk/>
+            <pc:sldMk cId="2999952593" sldId="258"/>
+            <ac:spMk id="90" creationId="{37BF7EAC-3889-4E74-BC3F-68E89327D804}"/>
+          </ac:spMkLst>
+        </pc:spChg>
+        <pc:spChg chg="mod topLvl">
+          <ac:chgData name="東村邦彦 / TOUMURA，KUNIHIKO" userId="aa80352f-8581-4c8d-8917-6e2824d17308" providerId="ADAL" clId="{1CA7E2A5-2B7D-45C5-BA10-5E9CF6D22FEF}" dt="2019-04-25T01:11:01.953" v="38" actId="164"/>
+          <ac:spMkLst>
+            <pc:docMk/>
+            <pc:sldMk cId="2999952593" sldId="258"/>
+            <ac:spMk id="136" creationId="{1B49BDAE-ED8B-49B2-BD5F-1D9907275C8D}"/>
+          </ac:spMkLst>
+        </pc:spChg>
+        <pc:spChg chg="mod topLvl">
+          <ac:chgData name="東村邦彦 / TOUMURA，KUNIHIKO" userId="aa80352f-8581-4c8d-8917-6e2824d17308" providerId="ADAL" clId="{1CA7E2A5-2B7D-45C5-BA10-5E9CF6D22FEF}" dt="2019-04-25T01:11:01.953" v="38" actId="164"/>
+          <ac:spMkLst>
+            <pc:docMk/>
+            <pc:sldMk cId="2999952593" sldId="258"/>
+            <ac:spMk id="137" creationId="{91006723-DA0B-4ABA-957C-AF6A78E36774}"/>
+          </ac:spMkLst>
+        </pc:spChg>
+        <pc:spChg chg="mod topLvl">
+          <ac:chgData name="東村邦彦 / TOUMURA，KUNIHIKO" userId="aa80352f-8581-4c8d-8917-6e2824d17308" providerId="ADAL" clId="{1CA7E2A5-2B7D-45C5-BA10-5E9CF6D22FEF}" dt="2019-04-25T01:11:01.953" v="38" actId="164"/>
+          <ac:spMkLst>
+            <pc:docMk/>
+            <pc:sldMk cId="2999952593" sldId="258"/>
+            <ac:spMk id="140" creationId="{4AC7C42A-F31C-4787-8D21-385E7D43CAB7}"/>
+          </ac:spMkLst>
+        </pc:spChg>
+        <pc:spChg chg="mod topLvl">
+          <ac:chgData name="東村邦彦 / TOUMURA，KUNIHIKO" userId="aa80352f-8581-4c8d-8917-6e2824d17308" providerId="ADAL" clId="{1CA7E2A5-2B7D-45C5-BA10-5E9CF6D22FEF}" dt="2019-04-25T01:11:01.953" v="38" actId="164"/>
+          <ac:spMkLst>
+            <pc:docMk/>
+            <pc:sldMk cId="2999952593" sldId="258"/>
+            <ac:spMk id="141" creationId="{C2031B7D-28F0-4D68-AA04-7199EEBCDE43}"/>
+          </ac:spMkLst>
+        </pc:spChg>
+        <pc:grpChg chg="add mod">
+          <ac:chgData name="東村邦彦 / TOUMURA，KUNIHIKO" userId="aa80352f-8581-4c8d-8917-6e2824d17308" providerId="ADAL" clId="{1CA7E2A5-2B7D-45C5-BA10-5E9CF6D22FEF}" dt="2019-04-25T01:11:01.953" v="38" actId="164"/>
+          <ac:grpSpMkLst>
+            <pc:docMk/>
+            <pc:sldMk cId="2999952593" sldId="258"/>
+            <ac:grpSpMk id="3" creationId="{88E812B6-F9CD-4D38-B44E-BE494587D0CA}"/>
+          </ac:grpSpMkLst>
+        </pc:grpChg>
+        <pc:grpChg chg="mod topLvl">
+          <ac:chgData name="東村邦彦 / TOUMURA，KUNIHIKO" userId="aa80352f-8581-4c8d-8917-6e2824d17308" providerId="ADAL" clId="{1CA7E2A5-2B7D-45C5-BA10-5E9CF6D22FEF}" dt="2019-04-25T01:11:01.953" v="38" actId="164"/>
+          <ac:grpSpMkLst>
+            <pc:docMk/>
+            <pc:sldMk cId="2999952593" sldId="258"/>
+            <ac:grpSpMk id="95" creationId="{71CF4339-53DB-4F43-99B4-63478E8E539F}"/>
+          </ac:grpSpMkLst>
+        </pc:grpChg>
+        <pc:grpChg chg="mod topLvl">
+          <ac:chgData name="東村邦彦 / TOUMURA，KUNIHIKO" userId="aa80352f-8581-4c8d-8917-6e2824d17308" providerId="ADAL" clId="{1CA7E2A5-2B7D-45C5-BA10-5E9CF6D22FEF}" dt="2019-04-25T01:11:01.953" v="38" actId="164"/>
+          <ac:grpSpMkLst>
+            <pc:docMk/>
+            <pc:sldMk cId="2999952593" sldId="258"/>
+            <ac:grpSpMk id="103" creationId="{7DCF0E36-9C53-4382-BF09-3D1BCDD938A8}"/>
+          </ac:grpSpMkLst>
+        </pc:grpChg>
+        <pc:grpChg chg="mod topLvl">
+          <ac:chgData name="東村邦彦 / TOUMURA，KUNIHIKO" userId="aa80352f-8581-4c8d-8917-6e2824d17308" providerId="ADAL" clId="{1CA7E2A5-2B7D-45C5-BA10-5E9CF6D22FEF}" dt="2019-04-25T01:11:01.953" v="38" actId="164"/>
+          <ac:grpSpMkLst>
+            <pc:docMk/>
+            <pc:sldMk cId="2999952593" sldId="258"/>
+            <ac:grpSpMk id="111" creationId="{0895C5DE-E120-4C97-B452-C6A9D22DBCC4}"/>
+          </ac:grpSpMkLst>
+        </pc:grpChg>
+        <pc:grpChg chg="del">
+          <ac:chgData name="東村邦彦 / TOUMURA，KUNIHIKO" userId="aa80352f-8581-4c8d-8917-6e2824d17308" providerId="ADAL" clId="{1CA7E2A5-2B7D-45C5-BA10-5E9CF6D22FEF}" dt="2019-04-25T00:46:36.194" v="8" actId="165"/>
+          <ac:grpSpMkLst>
+            <pc:docMk/>
+            <pc:sldMk cId="2999952593" sldId="258"/>
+            <ac:grpSpMk id="153" creationId="{6C2CDA82-5538-4118-91A0-F82F0B4B1EFA}"/>
+          </ac:grpSpMkLst>
+        </pc:grpChg>
+        <pc:cxnChg chg="mod topLvl">
+          <ac:chgData name="東村邦彦 / TOUMURA，KUNIHIKO" userId="aa80352f-8581-4c8d-8917-6e2824d17308" providerId="ADAL" clId="{1CA7E2A5-2B7D-45C5-BA10-5E9CF6D22FEF}" dt="2019-04-25T01:11:01.953" v="38" actId="164"/>
+          <ac:cxnSpMkLst>
+            <pc:docMk/>
+            <pc:sldMk cId="2999952593" sldId="258"/>
+            <ac:cxnSpMk id="37" creationId="{B88777B8-59B0-4259-AC12-EB3106E53B83}"/>
+          </ac:cxnSpMkLst>
+        </pc:cxnChg>
+        <pc:cxnChg chg="mod topLvl">
+          <ac:chgData name="東村邦彦 / TOUMURA，KUNIHIKO" userId="aa80352f-8581-4c8d-8917-6e2824d17308" providerId="ADAL" clId="{1CA7E2A5-2B7D-45C5-BA10-5E9CF6D22FEF}" dt="2019-04-25T01:11:01.953" v="38" actId="164"/>
+          <ac:cxnSpMkLst>
+            <pc:docMk/>
+            <pc:sldMk cId="2999952593" sldId="258"/>
+            <ac:cxnSpMk id="38" creationId="{5113A2AC-0F45-4A71-9D05-69B32CD7744B}"/>
+          </ac:cxnSpMkLst>
+        </pc:cxnChg>
+        <pc:cxnChg chg="mod topLvl">
+          <ac:chgData name="東村邦彦 / TOUMURA，KUNIHIKO" userId="aa80352f-8581-4c8d-8917-6e2824d17308" providerId="ADAL" clId="{1CA7E2A5-2B7D-45C5-BA10-5E9CF6D22FEF}" dt="2019-04-25T01:11:01.953" v="38" actId="164"/>
+          <ac:cxnSpMkLst>
+            <pc:docMk/>
+            <pc:sldMk cId="2999952593" sldId="258"/>
+            <ac:cxnSpMk id="43" creationId="{D3D5D467-DA8E-4868-AB3F-76D8B33830D7}"/>
+          </ac:cxnSpMkLst>
+        </pc:cxnChg>
+        <pc:cxnChg chg="mod topLvl">
+          <ac:chgData name="東村邦彦 / TOUMURA，KUNIHIKO" userId="aa80352f-8581-4c8d-8917-6e2824d17308" providerId="ADAL" clId="{1CA7E2A5-2B7D-45C5-BA10-5E9CF6D22FEF}" dt="2019-04-25T01:11:01.953" v="38" actId="164"/>
+          <ac:cxnSpMkLst>
+            <pc:docMk/>
+            <pc:sldMk cId="2999952593" sldId="258"/>
+            <ac:cxnSpMk id="57" creationId="{1BD0CE5B-A439-41AD-830D-CC6CC34A0BAC}"/>
+          </ac:cxnSpMkLst>
+        </pc:cxnChg>
+        <pc:cxnChg chg="mod topLvl">
+          <ac:chgData name="東村邦彦 / TOUMURA，KUNIHIKO" userId="aa80352f-8581-4c8d-8917-6e2824d17308" providerId="ADAL" clId="{1CA7E2A5-2B7D-45C5-BA10-5E9CF6D22FEF}" dt="2019-04-25T01:11:01.953" v="38" actId="164"/>
+          <ac:cxnSpMkLst>
+            <pc:docMk/>
+            <pc:sldMk cId="2999952593" sldId="258"/>
+            <ac:cxnSpMk id="58" creationId="{DF6AC9EC-5258-429C-BB66-565BB5D9BDD5}"/>
+          </ac:cxnSpMkLst>
+        </pc:cxnChg>
+        <pc:cxnChg chg="mod topLvl">
+          <ac:chgData name="東村邦彦 / TOUMURA，KUNIHIKO" userId="aa80352f-8581-4c8d-8917-6e2824d17308" providerId="ADAL" clId="{1CA7E2A5-2B7D-45C5-BA10-5E9CF6D22FEF}" dt="2019-04-25T01:11:01.953" v="38" actId="164"/>
+          <ac:cxnSpMkLst>
+            <pc:docMk/>
+            <pc:sldMk cId="2999952593" sldId="258"/>
+            <ac:cxnSpMk id="146" creationId="{BAC4CD7D-497E-48E3-9ADE-917CB7DACF82}"/>
+          </ac:cxnSpMkLst>
+        </pc:cxnChg>
+        <pc:cxnChg chg="mod topLvl">
+          <ac:chgData name="東村邦彦 / TOUMURA，KUNIHIKO" userId="aa80352f-8581-4c8d-8917-6e2824d17308" providerId="ADAL" clId="{1CA7E2A5-2B7D-45C5-BA10-5E9CF6D22FEF}" dt="2019-04-25T01:11:27.363" v="39" actId="14100"/>
+          <ac:cxnSpMkLst>
+            <pc:docMk/>
+            <pc:sldMk cId="2999952593" sldId="258"/>
+            <ac:cxnSpMk id="148" creationId="{C4227D80-CE85-4D18-9276-9923491CD9CD}"/>
+          </ac:cxnSpMkLst>
+        </pc:cxnChg>
+        <pc:cxnChg chg="mod topLvl">
+          <ac:chgData name="東村邦彦 / TOUMURA，KUNIHIKO" userId="aa80352f-8581-4c8d-8917-6e2824d17308" providerId="ADAL" clId="{1CA7E2A5-2B7D-45C5-BA10-5E9CF6D22FEF}" dt="2019-04-25T01:11:50.753" v="41" actId="14100"/>
+          <ac:cxnSpMkLst>
+            <pc:docMk/>
+            <pc:sldMk cId="2999952593" sldId="258"/>
+            <ac:cxnSpMk id="151" creationId="{0DEDAD89-F2ED-4462-8526-0CC39D14DE92}"/>
+          </ac:cxnSpMkLst>
+        </pc:cxnChg>
+      </pc:sldChg>
+      <pc:sldChg chg="addSp delSp modSp">
+        <pc:chgData name="東村邦彦 / TOUMURA，KUNIHIKO" userId="aa80352f-8581-4c8d-8917-6e2824d17308" providerId="ADAL" clId="{1CA7E2A5-2B7D-45C5-BA10-5E9CF6D22FEF}" dt="2019-04-25T00:35:11.551" v="5" actId="164"/>
+        <pc:sldMkLst>
+          <pc:docMk/>
+          <pc:sldMk cId="3973770788" sldId="259"/>
+        </pc:sldMkLst>
+        <pc:spChg chg="mod topLvl">
+          <ac:chgData name="東村邦彦 / TOUMURA，KUNIHIKO" userId="aa80352f-8581-4c8d-8917-6e2824d17308" providerId="ADAL" clId="{1CA7E2A5-2B7D-45C5-BA10-5E9CF6D22FEF}" dt="2019-04-25T00:35:11.551" v="5" actId="164"/>
+          <ac:spMkLst>
+            <pc:docMk/>
+            <pc:sldMk cId="3973770788" sldId="259"/>
+            <ac:spMk id="3" creationId="{E363D3A3-01B1-47AD-80FF-349AFB2C5EBC}"/>
+          </ac:spMkLst>
+        </pc:spChg>
+        <pc:spChg chg="mod topLvl">
+          <ac:chgData name="東村邦彦 / TOUMURA，KUNIHIKO" userId="aa80352f-8581-4c8d-8917-6e2824d17308" providerId="ADAL" clId="{1CA7E2A5-2B7D-45C5-BA10-5E9CF6D22FEF}" dt="2019-04-25T00:35:11.551" v="5" actId="164"/>
+          <ac:spMkLst>
+            <pc:docMk/>
+            <pc:sldMk cId="3973770788" sldId="259"/>
+            <ac:spMk id="5" creationId="{32BA485E-9115-4588-BFD6-C402552FE0EA}"/>
+          </ac:spMkLst>
+        </pc:spChg>
+        <pc:spChg chg="mod topLvl">
+          <ac:chgData name="東村邦彦 / TOUMURA，KUNIHIKO" userId="aa80352f-8581-4c8d-8917-6e2824d17308" providerId="ADAL" clId="{1CA7E2A5-2B7D-45C5-BA10-5E9CF6D22FEF}" dt="2019-04-25T00:35:11.551" v="5" actId="164"/>
+          <ac:spMkLst>
+            <pc:docMk/>
+            <pc:sldMk cId="3973770788" sldId="259"/>
+            <ac:spMk id="8" creationId="{A7AED8A8-5A51-434E-87BB-0AEC3AA37E5C}"/>
+          </ac:spMkLst>
+        </pc:spChg>
+        <pc:spChg chg="mod topLvl">
+          <ac:chgData name="東村邦彦 / TOUMURA，KUNIHIKO" userId="aa80352f-8581-4c8d-8917-6e2824d17308" providerId="ADAL" clId="{1CA7E2A5-2B7D-45C5-BA10-5E9CF6D22FEF}" dt="2019-04-25T00:35:11.551" v="5" actId="164"/>
+          <ac:spMkLst>
+            <pc:docMk/>
+            <pc:sldMk cId="3973770788" sldId="259"/>
+            <ac:spMk id="19" creationId="{B661B044-88DC-4521-9045-023EF41CCCE6}"/>
+          </ac:spMkLst>
+        </pc:spChg>
+        <pc:spChg chg="mod topLvl">
+          <ac:chgData name="東村邦彦 / TOUMURA，KUNIHIKO" userId="aa80352f-8581-4c8d-8917-6e2824d17308" providerId="ADAL" clId="{1CA7E2A5-2B7D-45C5-BA10-5E9CF6D22FEF}" dt="2019-04-25T00:35:11.551" v="5" actId="164"/>
+          <ac:spMkLst>
+            <pc:docMk/>
+            <pc:sldMk cId="3973770788" sldId="259"/>
+            <ac:spMk id="28" creationId="{30466EAD-08A2-46C7-8301-A128F3390555}"/>
+          </ac:spMkLst>
+        </pc:spChg>
+        <pc:spChg chg="mod topLvl">
+          <ac:chgData name="東村邦彦 / TOUMURA，KUNIHIKO" userId="aa80352f-8581-4c8d-8917-6e2824d17308" providerId="ADAL" clId="{1CA7E2A5-2B7D-45C5-BA10-5E9CF6D22FEF}" dt="2019-04-25T00:35:11.551" v="5" actId="164"/>
+          <ac:spMkLst>
+            <pc:docMk/>
+            <pc:sldMk cId="3973770788" sldId="259"/>
+            <ac:spMk id="29" creationId="{230DD35D-4841-4DDD-B58B-67EB43E14EFE}"/>
+          </ac:spMkLst>
+        </pc:spChg>
+        <pc:spChg chg="add mod">
+          <ac:chgData name="東村邦彦 / TOUMURA，KUNIHIKO" userId="aa80352f-8581-4c8d-8917-6e2824d17308" providerId="ADAL" clId="{1CA7E2A5-2B7D-45C5-BA10-5E9CF6D22FEF}" dt="2019-04-25T00:35:11.551" v="5" actId="164"/>
+          <ac:spMkLst>
+            <pc:docMk/>
+            <pc:sldMk cId="3973770788" sldId="259"/>
+            <ac:spMk id="60" creationId="{54230993-C53A-4AD8-BCD5-3391C77C6AB5}"/>
+          </ac:spMkLst>
+        </pc:spChg>
+        <pc:spChg chg="add mod">
+          <ac:chgData name="東村邦彦 / TOUMURA，KUNIHIKO" userId="aa80352f-8581-4c8d-8917-6e2824d17308" providerId="ADAL" clId="{1CA7E2A5-2B7D-45C5-BA10-5E9CF6D22FEF}" dt="2019-04-25T00:35:11.551" v="5" actId="164"/>
+          <ac:spMkLst>
+            <pc:docMk/>
+            <pc:sldMk cId="3973770788" sldId="259"/>
+            <ac:spMk id="61" creationId="{B8430410-D5E5-4D40-8B01-769E8D7DEA74}"/>
+          </ac:spMkLst>
+        </pc:spChg>
+        <pc:grpChg chg="add mod">
+          <ac:chgData name="東村邦彦 / TOUMURA，KUNIHIKO" userId="aa80352f-8581-4c8d-8917-6e2824d17308" providerId="ADAL" clId="{1CA7E2A5-2B7D-45C5-BA10-5E9CF6D22FEF}" dt="2019-04-25T00:35:11.551" v="5" actId="164"/>
+          <ac:grpSpMkLst>
+            <pc:docMk/>
+            <pc:sldMk cId="3973770788" sldId="259"/>
+            <ac:grpSpMk id="2" creationId="{9F5C8A22-7526-41CB-8FA7-321A136F25CF}"/>
+          </ac:grpSpMkLst>
+        </pc:grpChg>
+        <pc:grpChg chg="mod topLvl">
+          <ac:chgData name="東村邦彦 / TOUMURA，KUNIHIKO" userId="aa80352f-8581-4c8d-8917-6e2824d17308" providerId="ADAL" clId="{1CA7E2A5-2B7D-45C5-BA10-5E9CF6D22FEF}" dt="2019-04-25T00:35:11.551" v="5" actId="164"/>
+          <ac:grpSpMkLst>
+            <pc:docMk/>
+            <pc:sldMk cId="3973770788" sldId="259"/>
+            <ac:grpSpMk id="20" creationId="{74CF7E6A-36F8-4A62-A570-DD35CFC1F8D0}"/>
+          </ac:grpSpMkLst>
+        </pc:grpChg>
+        <pc:grpChg chg="mod topLvl">
+          <ac:chgData name="東村邦彦 / TOUMURA，KUNIHIKO" userId="aa80352f-8581-4c8d-8917-6e2824d17308" providerId="ADAL" clId="{1CA7E2A5-2B7D-45C5-BA10-5E9CF6D22FEF}" dt="2019-04-25T00:35:11.551" v="5" actId="164"/>
+          <ac:grpSpMkLst>
+            <pc:docMk/>
+            <pc:sldMk cId="3973770788" sldId="259"/>
+            <ac:grpSpMk id="36" creationId="{06EE5779-A918-46D8-B572-3B392C54E8F4}"/>
+          </ac:grpSpMkLst>
+        </pc:grpChg>
+        <pc:grpChg chg="mod topLvl">
+          <ac:chgData name="東村邦彦 / TOUMURA，KUNIHIKO" userId="aa80352f-8581-4c8d-8917-6e2824d17308" providerId="ADAL" clId="{1CA7E2A5-2B7D-45C5-BA10-5E9CF6D22FEF}" dt="2019-04-25T00:35:11.551" v="5" actId="164"/>
+          <ac:grpSpMkLst>
+            <pc:docMk/>
+            <pc:sldMk cId="3973770788" sldId="259"/>
+            <ac:grpSpMk id="44" creationId="{8F2C82E1-AF8D-44EC-93F2-CCD09161E2B9}"/>
+          </ac:grpSpMkLst>
+        </pc:grpChg>
+        <pc:grpChg chg="mod topLvl">
+          <ac:chgData name="東村邦彦 / TOUMURA，KUNIHIKO" userId="aa80352f-8581-4c8d-8917-6e2824d17308" providerId="ADAL" clId="{1CA7E2A5-2B7D-45C5-BA10-5E9CF6D22FEF}" dt="2019-04-25T00:35:11.551" v="5" actId="164"/>
+          <ac:grpSpMkLst>
+            <pc:docMk/>
+            <pc:sldMk cId="3973770788" sldId="259"/>
+            <ac:grpSpMk id="54" creationId="{5DAED7C3-51A9-429A-9812-2A0E70FF2BF3}"/>
+          </ac:grpSpMkLst>
+        </pc:grpChg>
+        <pc:grpChg chg="mod topLvl">
+          <ac:chgData name="東村邦彦 / TOUMURA，KUNIHIKO" userId="aa80352f-8581-4c8d-8917-6e2824d17308" providerId="ADAL" clId="{1CA7E2A5-2B7D-45C5-BA10-5E9CF6D22FEF}" dt="2019-04-25T00:35:11.551" v="5" actId="164"/>
+          <ac:grpSpMkLst>
+            <pc:docMk/>
+            <pc:sldMk cId="3973770788" sldId="259"/>
+            <ac:grpSpMk id="55" creationId="{88B0FF46-DB1C-4E22-BA75-B39F61E0FB59}"/>
+          </ac:grpSpMkLst>
+        </pc:grpChg>
+        <pc:grpChg chg="del">
+          <ac:chgData name="東村邦彦 / TOUMURA，KUNIHIKO" userId="aa80352f-8581-4c8d-8917-6e2824d17308" providerId="ADAL" clId="{1CA7E2A5-2B7D-45C5-BA10-5E9CF6D22FEF}" dt="2019-04-25T00:35:03.667" v="4" actId="165"/>
+          <ac:grpSpMkLst>
+            <pc:docMk/>
+            <pc:sldMk cId="3973770788" sldId="259"/>
+            <ac:grpSpMk id="58" creationId="{8409BA8A-037E-4A7D-B1D1-F040C893EFD2}"/>
+          </ac:grpSpMkLst>
+        </pc:grpChg>
+        <pc:cxnChg chg="mod topLvl">
+          <ac:chgData name="東村邦彦 / TOUMURA，KUNIHIKO" userId="aa80352f-8581-4c8d-8917-6e2824d17308" providerId="ADAL" clId="{1CA7E2A5-2B7D-45C5-BA10-5E9CF6D22FEF}" dt="2019-04-25T00:35:11.551" v="5" actId="164"/>
+          <ac:cxnSpMkLst>
+            <pc:docMk/>
+            <pc:sldMk cId="3973770788" sldId="259"/>
+            <ac:cxnSpMk id="10" creationId="{4FAD964C-1DBA-40E0-8C32-D82CC870F14E}"/>
+          </ac:cxnSpMkLst>
+        </pc:cxnChg>
+        <pc:cxnChg chg="mod topLvl">
+          <ac:chgData name="東村邦彦 / TOUMURA，KUNIHIKO" userId="aa80352f-8581-4c8d-8917-6e2824d17308" providerId="ADAL" clId="{1CA7E2A5-2B7D-45C5-BA10-5E9CF6D22FEF}" dt="2019-04-25T00:35:11.551" v="5" actId="164"/>
+          <ac:cxnSpMkLst>
+            <pc:docMk/>
+            <pc:sldMk cId="3973770788" sldId="259"/>
+            <ac:cxnSpMk id="31" creationId="{2D52E744-C6C8-4AA9-8C22-F3007B39E8B4}"/>
+          </ac:cxnSpMkLst>
+        </pc:cxnChg>
+        <pc:cxnChg chg="mod topLvl">
+          <ac:chgData name="東村邦彦 / TOUMURA，KUNIHIKO" userId="aa80352f-8581-4c8d-8917-6e2824d17308" providerId="ADAL" clId="{1CA7E2A5-2B7D-45C5-BA10-5E9CF6D22FEF}" dt="2019-04-25T00:35:11.551" v="5" actId="164"/>
+          <ac:cxnSpMkLst>
+            <pc:docMk/>
+            <pc:sldMk cId="3973770788" sldId="259"/>
+            <ac:cxnSpMk id="33" creationId="{07FCC90C-305E-43CD-8CCE-962DB323C015}"/>
+          </ac:cxnSpMkLst>
+        </pc:cxnChg>
+      </pc:sldChg>
+    </pc:docChg>
+  </pc:docChgLst>
+  <pc:docChgLst>
+    <pc:chgData name="東村邦彦 / TOUMURA，KUNIHIKO" userId="aa80352f-8581-4c8d-8917-6e2824d17308" providerId="ADAL" clId="{92752F1B-DB06-4D67-9EB8-372D3E76C027}"/>
+    <pc:docChg chg="undo modSld">
+      <pc:chgData name="東村邦彦 / TOUMURA，KUNIHIKO" userId="aa80352f-8581-4c8d-8917-6e2824d17308" providerId="ADAL" clId="{92752F1B-DB06-4D67-9EB8-372D3E76C027}" dt="2019-04-25T10:00:26.557" v="37" actId="164"/>
+      <pc:docMkLst>
+        <pc:docMk/>
+      </pc:docMkLst>
+      <pc:sldChg chg="addSp delSp modSp">
+        <pc:chgData name="東村邦彦 / TOUMURA，KUNIHIKO" userId="aa80352f-8581-4c8d-8917-6e2824d17308" providerId="ADAL" clId="{92752F1B-DB06-4D67-9EB8-372D3E76C027}" dt="2019-04-25T10:00:26.557" v="37" actId="164"/>
+        <pc:sldMkLst>
+          <pc:docMk/>
+          <pc:sldMk cId="2999952593" sldId="258"/>
+        </pc:sldMkLst>
+        <pc:spChg chg="mod">
+          <ac:chgData name="東村邦彦 / TOUMURA，KUNIHIKO" userId="aa80352f-8581-4c8d-8917-6e2824d17308" providerId="ADAL" clId="{92752F1B-DB06-4D67-9EB8-372D3E76C027}" dt="2019-04-25T09:59:36.382" v="34" actId="1076"/>
+          <ac:spMkLst>
+            <pc:docMk/>
+            <pc:sldMk cId="2999952593" sldId="258"/>
+            <ac:spMk id="2" creationId="{9E4C9375-48E1-4422-A822-537FF10D8769}"/>
+          </ac:spMkLst>
+        </pc:spChg>
+        <pc:spChg chg="mod ord topLvl">
+          <ac:chgData name="東村邦彦 / TOUMURA，KUNIHIKO" userId="aa80352f-8581-4c8d-8917-6e2824d17308" providerId="ADAL" clId="{92752F1B-DB06-4D67-9EB8-372D3E76C027}" dt="2019-04-25T10:00:26.557" v="37" actId="164"/>
+          <ac:spMkLst>
+            <pc:docMk/>
+            <pc:sldMk cId="2999952593" sldId="258"/>
+            <ac:spMk id="4" creationId="{529EACCC-C218-4181-AB85-88A152772189}"/>
+          </ac:spMkLst>
+        </pc:spChg>
+        <pc:spChg chg="mod topLvl">
+          <ac:chgData name="東村邦彦 / TOUMURA，KUNIHIKO" userId="aa80352f-8581-4c8d-8917-6e2824d17308" providerId="ADAL" clId="{92752F1B-DB06-4D67-9EB8-372D3E76C027}" dt="2019-04-25T10:00:26.557" v="37" actId="164"/>
+          <ac:spMkLst>
+            <pc:docMk/>
+            <pc:sldMk cId="2999952593" sldId="258"/>
+            <ac:spMk id="41" creationId="{7D117D8E-F664-4207-A0BE-A36DBAF3959A}"/>
+          </ac:spMkLst>
+        </pc:spChg>
+        <pc:spChg chg="mod topLvl">
+          <ac:chgData name="東村邦彦 / TOUMURA，KUNIHIKO" userId="aa80352f-8581-4c8d-8917-6e2824d17308" providerId="ADAL" clId="{92752F1B-DB06-4D67-9EB8-372D3E76C027}" dt="2019-04-25T10:00:26.557" v="37" actId="164"/>
+          <ac:spMkLst>
+            <pc:docMk/>
+            <pc:sldMk cId="2999952593" sldId="258"/>
+            <ac:spMk id="47" creationId="{286BA5D7-ADFF-4092-9C52-8D7D5BBA0127}"/>
+          </ac:spMkLst>
+        </pc:spChg>
+        <pc:spChg chg="add mod">
+          <ac:chgData name="東村邦彦 / TOUMURA，KUNIHIKO" userId="aa80352f-8581-4c8d-8917-6e2824d17308" providerId="ADAL" clId="{92752F1B-DB06-4D67-9EB8-372D3E76C027}" dt="2019-04-25T10:00:26.557" v="37" actId="164"/>
+          <ac:spMkLst>
+            <pc:docMk/>
+            <pc:sldMk cId="2999952593" sldId="258"/>
+            <ac:spMk id="48" creationId="{4BAE56B0-F843-4AB5-AB04-C7C6372F2AF5}"/>
+          </ac:spMkLst>
+        </pc:spChg>
+        <pc:spChg chg="mod topLvl">
+          <ac:chgData name="東村邦彦 / TOUMURA，KUNIHIKO" userId="aa80352f-8581-4c8d-8917-6e2824d17308" providerId="ADAL" clId="{92752F1B-DB06-4D67-9EB8-372D3E76C027}" dt="2019-04-25T10:00:26.557" v="37" actId="164"/>
+          <ac:spMkLst>
+            <pc:docMk/>
+            <pc:sldMk cId="2999952593" sldId="258"/>
+            <ac:spMk id="54" creationId="{DF0A1329-0B41-49D4-90D5-70946F050AAD}"/>
+          </ac:spMkLst>
+        </pc:spChg>
+        <pc:spChg chg="mod topLvl">
+          <ac:chgData name="東村邦彦 / TOUMURA，KUNIHIKO" userId="aa80352f-8581-4c8d-8917-6e2824d17308" providerId="ADAL" clId="{92752F1B-DB06-4D67-9EB8-372D3E76C027}" dt="2019-04-25T10:00:26.557" v="37" actId="164"/>
+          <ac:spMkLst>
+            <pc:docMk/>
+            <pc:sldMk cId="2999952593" sldId="258"/>
+            <ac:spMk id="55" creationId="{0537BC9F-7751-4EB4-B6C2-0E4A7730EDF0}"/>
+          </ac:spMkLst>
+        </pc:spChg>
+        <pc:spChg chg="mod topLvl">
+          <ac:chgData name="東村邦彦 / TOUMURA，KUNIHIKO" userId="aa80352f-8581-4c8d-8917-6e2824d17308" providerId="ADAL" clId="{92752F1B-DB06-4D67-9EB8-372D3E76C027}" dt="2019-04-25T10:00:26.557" v="37" actId="164"/>
+          <ac:spMkLst>
+            <pc:docMk/>
+            <pc:sldMk cId="2999952593" sldId="258"/>
+            <ac:spMk id="87" creationId="{940FE31F-5355-4155-B7B3-79D4EAC17461}"/>
+          </ac:spMkLst>
+        </pc:spChg>
+        <pc:spChg chg="mod ord topLvl">
+          <ac:chgData name="東村邦彦 / TOUMURA，KUNIHIKO" userId="aa80352f-8581-4c8d-8917-6e2824d17308" providerId="ADAL" clId="{92752F1B-DB06-4D67-9EB8-372D3E76C027}" dt="2019-04-25T10:00:26.557" v="37" actId="164"/>
+          <ac:spMkLst>
+            <pc:docMk/>
+            <pc:sldMk cId="2999952593" sldId="258"/>
+            <ac:spMk id="89" creationId="{C3343050-8CC9-4B75-B876-F2F33E35216C}"/>
+          </ac:spMkLst>
+        </pc:spChg>
+        <pc:spChg chg="mod ord topLvl">
+          <ac:chgData name="東村邦彦 / TOUMURA，KUNIHIKO" userId="aa80352f-8581-4c8d-8917-6e2824d17308" providerId="ADAL" clId="{92752F1B-DB06-4D67-9EB8-372D3E76C027}" dt="2019-04-25T10:00:26.557" v="37" actId="164"/>
+          <ac:spMkLst>
+            <pc:docMk/>
+            <pc:sldMk cId="2999952593" sldId="258"/>
+            <ac:spMk id="90" creationId="{37BF7EAC-3889-4E74-BC3F-68E89327D804}"/>
+          </ac:spMkLst>
+        </pc:spChg>
+        <pc:spChg chg="mod topLvl">
+          <ac:chgData name="東村邦彦 / TOUMURA，KUNIHIKO" userId="aa80352f-8581-4c8d-8917-6e2824d17308" providerId="ADAL" clId="{92752F1B-DB06-4D67-9EB8-372D3E76C027}" dt="2019-04-25T10:00:26.557" v="37" actId="164"/>
+          <ac:spMkLst>
+            <pc:docMk/>
+            <pc:sldMk cId="2999952593" sldId="258"/>
+            <ac:spMk id="136" creationId="{1B49BDAE-ED8B-49B2-BD5F-1D9907275C8D}"/>
+          </ac:spMkLst>
+        </pc:spChg>
+        <pc:spChg chg="mod topLvl">
+          <ac:chgData name="東村邦彦 / TOUMURA，KUNIHIKO" userId="aa80352f-8581-4c8d-8917-6e2824d17308" providerId="ADAL" clId="{92752F1B-DB06-4D67-9EB8-372D3E76C027}" dt="2019-04-25T10:00:26.557" v="37" actId="164"/>
+          <ac:spMkLst>
+            <pc:docMk/>
+            <pc:sldMk cId="2999952593" sldId="258"/>
+            <ac:spMk id="137" creationId="{91006723-DA0B-4ABA-957C-AF6A78E36774}"/>
+          </ac:spMkLst>
+        </pc:spChg>
+        <pc:spChg chg="mod topLvl">
+          <ac:chgData name="東村邦彦 / TOUMURA，KUNIHIKO" userId="aa80352f-8581-4c8d-8917-6e2824d17308" providerId="ADAL" clId="{92752F1B-DB06-4D67-9EB8-372D3E76C027}" dt="2019-04-25T10:00:26.557" v="37" actId="164"/>
+          <ac:spMkLst>
+            <pc:docMk/>
+            <pc:sldMk cId="2999952593" sldId="258"/>
+            <ac:spMk id="140" creationId="{4AC7C42A-F31C-4787-8D21-385E7D43CAB7}"/>
+          </ac:spMkLst>
+        </pc:spChg>
+        <pc:spChg chg="mod topLvl">
+          <ac:chgData name="東村邦彦 / TOUMURA，KUNIHIKO" userId="aa80352f-8581-4c8d-8917-6e2824d17308" providerId="ADAL" clId="{92752F1B-DB06-4D67-9EB8-372D3E76C027}" dt="2019-04-25T10:00:26.557" v="37" actId="164"/>
+          <ac:spMkLst>
+            <pc:docMk/>
+            <pc:sldMk cId="2999952593" sldId="258"/>
+            <ac:spMk id="141" creationId="{C2031B7D-28F0-4D68-AA04-7199EEBCDE43}"/>
+          </ac:spMkLst>
+        </pc:spChg>
+        <pc:grpChg chg="del">
+          <ac:chgData name="東村邦彦 / TOUMURA，KUNIHIKO" userId="aa80352f-8581-4c8d-8917-6e2824d17308" providerId="ADAL" clId="{92752F1B-DB06-4D67-9EB8-372D3E76C027}" dt="2019-04-25T09:55:12.694" v="0" actId="165"/>
+          <ac:grpSpMkLst>
+            <pc:docMk/>
+            <pc:sldMk cId="2999952593" sldId="258"/>
+            <ac:grpSpMk id="3" creationId="{88E812B6-F9CD-4D38-B44E-BE494587D0CA}"/>
+          </ac:grpSpMkLst>
+        </pc:grpChg>
+        <pc:grpChg chg="add mod">
+          <ac:chgData name="東村邦彦 / TOUMURA，KUNIHIKO" userId="aa80352f-8581-4c8d-8917-6e2824d17308" providerId="ADAL" clId="{92752F1B-DB06-4D67-9EB8-372D3E76C027}" dt="2019-04-25T10:00:26.557" v="37" actId="164"/>
+          <ac:grpSpMkLst>
+            <pc:docMk/>
+            <pc:sldMk cId="2999952593" sldId="258"/>
+            <ac:grpSpMk id="5" creationId="{84B8E6AD-9A07-4A91-9CB4-8189A9B2A427}"/>
+          </ac:grpSpMkLst>
+        </pc:grpChg>
+        <pc:grpChg chg="mod topLvl">
+          <ac:chgData name="東村邦彦 / TOUMURA，KUNIHIKO" userId="aa80352f-8581-4c8d-8917-6e2824d17308" providerId="ADAL" clId="{92752F1B-DB06-4D67-9EB8-372D3E76C027}" dt="2019-04-25T10:00:26.557" v="37" actId="164"/>
+          <ac:grpSpMkLst>
+            <pc:docMk/>
+            <pc:sldMk cId="2999952593" sldId="258"/>
+            <ac:grpSpMk id="95" creationId="{71CF4339-53DB-4F43-99B4-63478E8E539F}"/>
+          </ac:grpSpMkLst>
+        </pc:grpChg>
+        <pc:grpChg chg="mod topLvl">
+          <ac:chgData name="東村邦彦 / TOUMURA，KUNIHIKO" userId="aa80352f-8581-4c8d-8917-6e2824d17308" providerId="ADAL" clId="{92752F1B-DB06-4D67-9EB8-372D3E76C027}" dt="2019-04-25T10:00:26.557" v="37" actId="164"/>
+          <ac:grpSpMkLst>
+            <pc:docMk/>
+            <pc:sldMk cId="2999952593" sldId="258"/>
+            <ac:grpSpMk id="103" creationId="{7DCF0E36-9C53-4382-BF09-3D1BCDD938A8}"/>
+          </ac:grpSpMkLst>
+        </pc:grpChg>
+        <pc:grpChg chg="mod topLvl">
+          <ac:chgData name="東村邦彦 / TOUMURA，KUNIHIKO" userId="aa80352f-8581-4c8d-8917-6e2824d17308" providerId="ADAL" clId="{92752F1B-DB06-4D67-9EB8-372D3E76C027}" dt="2019-04-25T10:00:26.557" v="37" actId="164"/>
+          <ac:grpSpMkLst>
+            <pc:docMk/>
+            <pc:sldMk cId="2999952593" sldId="258"/>
+            <ac:grpSpMk id="111" creationId="{0895C5DE-E120-4C97-B452-C6A9D22DBCC4}"/>
+          </ac:grpSpMkLst>
+        </pc:grpChg>
+        <pc:cxnChg chg="mod topLvl">
+          <ac:chgData name="東村邦彦 / TOUMURA，KUNIHIKO" userId="aa80352f-8581-4c8d-8917-6e2824d17308" providerId="ADAL" clId="{92752F1B-DB06-4D67-9EB8-372D3E76C027}" dt="2019-04-25T10:00:26.557" v="37" actId="164"/>
+          <ac:cxnSpMkLst>
+            <pc:docMk/>
+            <pc:sldMk cId="2999952593" sldId="258"/>
+            <ac:cxnSpMk id="37" creationId="{B88777B8-59B0-4259-AC12-EB3106E53B83}"/>
+          </ac:cxnSpMkLst>
+        </pc:cxnChg>
+        <pc:cxnChg chg="mod topLvl">
+          <ac:chgData name="東村邦彦 / TOUMURA，KUNIHIKO" userId="aa80352f-8581-4c8d-8917-6e2824d17308" providerId="ADAL" clId="{92752F1B-DB06-4D67-9EB8-372D3E76C027}" dt="2019-04-25T10:00:26.557" v="37" actId="164"/>
+          <ac:cxnSpMkLst>
+            <pc:docMk/>
+            <pc:sldMk cId="2999952593" sldId="258"/>
+            <ac:cxnSpMk id="38" creationId="{5113A2AC-0F45-4A71-9D05-69B32CD7744B}"/>
+          </ac:cxnSpMkLst>
+        </pc:cxnChg>
+        <pc:cxnChg chg="mod topLvl">
+          <ac:chgData name="東村邦彦 / TOUMURA，KUNIHIKO" userId="aa80352f-8581-4c8d-8917-6e2824d17308" providerId="ADAL" clId="{92752F1B-DB06-4D67-9EB8-372D3E76C027}" dt="2019-04-25T10:00:26.557" v="37" actId="164"/>
+          <ac:cxnSpMkLst>
+            <pc:docMk/>
+            <pc:sldMk cId="2999952593" sldId="258"/>
+            <ac:cxnSpMk id="43" creationId="{D3D5D467-DA8E-4868-AB3F-76D8B33830D7}"/>
+          </ac:cxnSpMkLst>
+        </pc:cxnChg>
+        <pc:cxnChg chg="mod topLvl">
+          <ac:chgData name="東村邦彦 / TOUMURA，KUNIHIKO" userId="aa80352f-8581-4c8d-8917-6e2824d17308" providerId="ADAL" clId="{92752F1B-DB06-4D67-9EB8-372D3E76C027}" dt="2019-04-25T10:00:26.557" v="37" actId="164"/>
+          <ac:cxnSpMkLst>
+            <pc:docMk/>
+            <pc:sldMk cId="2999952593" sldId="258"/>
+            <ac:cxnSpMk id="57" creationId="{1BD0CE5B-A439-41AD-830D-CC6CC34A0BAC}"/>
+          </ac:cxnSpMkLst>
+        </pc:cxnChg>
+        <pc:cxnChg chg="mod topLvl">
+          <ac:chgData name="東村邦彦 / TOUMURA，KUNIHIKO" userId="aa80352f-8581-4c8d-8917-6e2824d17308" providerId="ADAL" clId="{92752F1B-DB06-4D67-9EB8-372D3E76C027}" dt="2019-04-25T10:00:26.557" v="37" actId="164"/>
+          <ac:cxnSpMkLst>
+            <pc:docMk/>
+            <pc:sldMk cId="2999952593" sldId="258"/>
+            <ac:cxnSpMk id="58" creationId="{DF6AC9EC-5258-429C-BB66-565BB5D9BDD5}"/>
+          </ac:cxnSpMkLst>
+        </pc:cxnChg>
+        <pc:cxnChg chg="mod topLvl">
+          <ac:chgData name="東村邦彦 / TOUMURA，KUNIHIKO" userId="aa80352f-8581-4c8d-8917-6e2824d17308" providerId="ADAL" clId="{92752F1B-DB06-4D67-9EB8-372D3E76C027}" dt="2019-04-25T10:00:26.557" v="37" actId="164"/>
+          <ac:cxnSpMkLst>
+            <pc:docMk/>
+            <pc:sldMk cId="2999952593" sldId="258"/>
+            <ac:cxnSpMk id="146" creationId="{BAC4CD7D-497E-48E3-9ADE-917CB7DACF82}"/>
+          </ac:cxnSpMkLst>
+        </pc:cxnChg>
+        <pc:cxnChg chg="mod topLvl">
+          <ac:chgData name="東村邦彦 / TOUMURA，KUNIHIKO" userId="aa80352f-8581-4c8d-8917-6e2824d17308" providerId="ADAL" clId="{92752F1B-DB06-4D67-9EB8-372D3E76C027}" dt="2019-04-25T10:00:26.557" v="37" actId="164"/>
+          <ac:cxnSpMkLst>
+            <pc:docMk/>
+            <pc:sldMk cId="2999952593" sldId="258"/>
+            <ac:cxnSpMk id="148" creationId="{C4227D80-CE85-4D18-9276-9923491CD9CD}"/>
+          </ac:cxnSpMkLst>
+        </pc:cxnChg>
+        <pc:cxnChg chg="mod topLvl">
+          <ac:chgData name="東村邦彦 / TOUMURA，KUNIHIKO" userId="aa80352f-8581-4c8d-8917-6e2824d17308" providerId="ADAL" clId="{92752F1B-DB06-4D67-9EB8-372D3E76C027}" dt="2019-04-25T10:00:26.557" v="37" actId="164"/>
+          <ac:cxnSpMkLst>
+            <pc:docMk/>
+            <pc:sldMk cId="2999952593" sldId="258"/>
+            <ac:cxnSpMk id="151" creationId="{0DEDAD89-F2ED-4462-8526-0CC39D14DE92}"/>
+          </ac:cxnSpMkLst>
+        </pc:cxnChg>
+      </pc:sldChg>
+    </pc:docChg>
+  </pc:docChgLst>
+</pc:chgInfo>
+</file>
+
 <file path=ppt/notesMasters/notesMaster1.xml><?xml version="1.0" encoding="utf-8"?>
 <p:notesMaster xmlns:a="http://schemas.openxmlformats.org/drawingml/2006/main" xmlns:r="http://schemas.openxmlformats.org/officeDocument/2006/relationships" xmlns:p="http://schemas.openxmlformats.org/presentationml/2006/main">
   <p:cSld>
@@ -207,7 +828,7 @@
           <a:p>
             <a:fld id="{C7CE29F4-C213-4F14-8BBA-60472E91A4D9}" type="datetimeFigureOut">
               <a:rPr kumimoji="1" lang="ja-JP" altLang="en-US" smtClean="0"/>
-              <a:t>2019/4/22</a:t>
+              <a:t>2019/4/25</a:t>
             </a:fld>
             <a:endParaRPr kumimoji="1" lang="ja-JP" altLang="en-US"/>
           </a:p>
@@ -1667,7 +2288,7 @@
           <a:p>
             <a:fld id="{83F10594-1B62-4B90-920A-44E63AFA5E18}" type="datetimeFigureOut">
               <a:rPr kumimoji="1" lang="ja-JP" altLang="en-US" smtClean="0"/>
-              <a:t>2019/4/22</a:t>
+              <a:t>2019/4/25</a:t>
             </a:fld>
             <a:endParaRPr kumimoji="1" lang="ja-JP" altLang="en-US"/>
           </a:p>
@@ -1867,7 +2488,7 @@
           <a:p>
             <a:fld id="{83F10594-1B62-4B90-920A-44E63AFA5E18}" type="datetimeFigureOut">
               <a:rPr kumimoji="1" lang="ja-JP" altLang="en-US" smtClean="0"/>
-              <a:t>2019/4/22</a:t>
+              <a:t>2019/4/25</a:t>
             </a:fld>
             <a:endParaRPr kumimoji="1" lang="ja-JP" altLang="en-US"/>
           </a:p>
@@ -2077,7 +2698,7 @@
           <a:p>
             <a:fld id="{83F10594-1B62-4B90-920A-44E63AFA5E18}" type="datetimeFigureOut">
               <a:rPr kumimoji="1" lang="ja-JP" altLang="en-US" smtClean="0"/>
-              <a:t>2019/4/22</a:t>
+              <a:t>2019/4/25</a:t>
             </a:fld>
             <a:endParaRPr kumimoji="1" lang="ja-JP" altLang="en-US"/>
           </a:p>
@@ -2277,7 +2898,7 @@
           <a:p>
             <a:fld id="{83F10594-1B62-4B90-920A-44E63AFA5E18}" type="datetimeFigureOut">
               <a:rPr kumimoji="1" lang="ja-JP" altLang="en-US" smtClean="0"/>
-              <a:t>2019/4/22</a:t>
+              <a:t>2019/4/25</a:t>
             </a:fld>
             <a:endParaRPr kumimoji="1" lang="ja-JP" altLang="en-US"/>
           </a:p>
@@ -2522,7 +3143,7 @@
           <a:p>
             <a:fld id="{83F10594-1B62-4B90-920A-44E63AFA5E18}" type="datetimeFigureOut">
               <a:rPr kumimoji="1" lang="ja-JP" altLang="en-US" smtClean="0"/>
-              <a:t>2019/4/22</a:t>
+              <a:t>2019/4/25</a:t>
             </a:fld>
             <a:endParaRPr kumimoji="1" lang="ja-JP" altLang="en-US"/>
           </a:p>
@@ -2815,7 +3436,7 @@
           <a:p>
             <a:fld id="{83F10594-1B62-4B90-920A-44E63AFA5E18}" type="datetimeFigureOut">
               <a:rPr kumimoji="1" lang="ja-JP" altLang="en-US" smtClean="0"/>
-              <a:t>2019/4/22</a:t>
+              <a:t>2019/4/25</a:t>
             </a:fld>
             <a:endParaRPr kumimoji="1" lang="ja-JP" altLang="en-US"/>
           </a:p>
@@ -3243,7 +3864,7 @@
           <a:p>
             <a:fld id="{83F10594-1B62-4B90-920A-44E63AFA5E18}" type="datetimeFigureOut">
               <a:rPr kumimoji="1" lang="ja-JP" altLang="en-US" smtClean="0"/>
-              <a:t>2019/4/22</a:t>
+              <a:t>2019/4/25</a:t>
             </a:fld>
             <a:endParaRPr kumimoji="1" lang="ja-JP" altLang="en-US"/>
           </a:p>
@@ -3360,7 +3981,7 @@
           <a:p>
             <a:fld id="{83F10594-1B62-4B90-920A-44E63AFA5E18}" type="datetimeFigureOut">
               <a:rPr kumimoji="1" lang="ja-JP" altLang="en-US" smtClean="0"/>
-              <a:t>2019/4/22</a:t>
+              <a:t>2019/4/25</a:t>
             </a:fld>
             <a:endParaRPr kumimoji="1" lang="ja-JP" altLang="en-US"/>
           </a:p>
@@ -3455,7 +4076,7 @@
           <a:p>
             <a:fld id="{83F10594-1B62-4B90-920A-44E63AFA5E18}" type="datetimeFigureOut">
               <a:rPr kumimoji="1" lang="ja-JP" altLang="en-US" smtClean="0"/>
-              <a:t>2019/4/22</a:t>
+              <a:t>2019/4/25</a:t>
             </a:fld>
             <a:endParaRPr kumimoji="1" lang="ja-JP" altLang="en-US"/>
           </a:p>
@@ -3762,7 +4383,7 @@
           <a:p>
             <a:fld id="{83F10594-1B62-4B90-920A-44E63AFA5E18}" type="datetimeFigureOut">
               <a:rPr kumimoji="1" lang="ja-JP" altLang="en-US" smtClean="0"/>
-              <a:t>2019/4/22</a:t>
+              <a:t>2019/4/25</a:t>
             </a:fld>
             <a:endParaRPr kumimoji="1" lang="ja-JP" altLang="en-US"/>
           </a:p>
@@ -4017,7 +4638,7 @@
           <a:p>
             <a:fld id="{83F10594-1B62-4B90-920A-44E63AFA5E18}" type="datetimeFigureOut">
               <a:rPr kumimoji="1" lang="ja-JP" altLang="en-US" smtClean="0"/>
-              <a:t>2019/4/22</a:t>
+              <a:t>2019/4/25</a:t>
             </a:fld>
             <a:endParaRPr kumimoji="1" lang="ja-JP" altLang="en-US"/>
           </a:p>
@@ -4260,7 +4881,7 @@
           <a:p>
             <a:fld id="{83F10594-1B62-4B90-920A-44E63AFA5E18}" type="datetimeFigureOut">
               <a:rPr kumimoji="1" lang="ja-JP" altLang="en-US" smtClean="0"/>
-              <a:t>2019/4/22</a:t>
+              <a:t>2019/4/25</a:t>
             </a:fld>
             <a:endParaRPr kumimoji="1" lang="ja-JP" altLang="en-US"/>
           </a:p>
@@ -11136,16 +11757,16 @@
           <a:lstStyle/>
           <a:p>
             <a:pPr algn="ctr"/>
-            <a:endParaRPr kumimoji="1" lang="ja-JP" altLang="en-US"/>
+            <a:endParaRPr kumimoji="1" lang="ja-JP" altLang="en-US" dirty="0"/>
           </a:p>
         </p:txBody>
       </p:sp>
       <p:grpSp>
         <p:nvGrpSpPr>
-          <p:cNvPr id="153" name="グループ化 152">
+          <p:cNvPr id="5" name="グループ化 4">
             <a:extLst>
               <a:ext uri="{FF2B5EF4-FFF2-40B4-BE49-F238E27FC236}">
-                <a16:creationId xmlns:a16="http://schemas.microsoft.com/office/drawing/2014/main" id="{6C2CDA82-5538-4118-91A0-F82F0B4B1EFA}"/>
+                <a16:creationId xmlns:a16="http://schemas.microsoft.com/office/drawing/2014/main" id="{84B8E6AD-9A07-4A91-9CB4-8189A9B2A427}"/>
               </a:ext>
             </a:extLst>
           </p:cNvPr>
@@ -11160,90 +11781,6 @@
             <a:chExt cx="8125022" cy="3050996"/>
           </a:xfrm>
         </p:grpSpPr>
-        <p:sp>
-          <p:nvSpPr>
-            <p:cNvPr id="4" name="角丸四角形 6">
-              <a:extLst>
-                <a:ext uri="{FF2B5EF4-FFF2-40B4-BE49-F238E27FC236}">
-                  <a16:creationId xmlns:a16="http://schemas.microsoft.com/office/drawing/2014/main" id="{529EACCC-C218-4181-AB85-88A152772189}"/>
-                </a:ext>
-              </a:extLst>
-            </p:cNvPr>
-            <p:cNvSpPr/>
-            <p:nvPr/>
-          </p:nvSpPr>
-          <p:spPr bwMode="auto">
-            <a:xfrm>
-              <a:off x="5377602" y="3747353"/>
-              <a:ext cx="1440000" cy="720000"/>
-            </a:xfrm>
-            <a:prstGeom prst="roundRect">
-              <a:avLst>
-                <a:gd name="adj" fmla="val 5032"/>
-              </a:avLst>
-            </a:prstGeom>
-            <a:solidFill>
-              <a:sysClr val="window" lastClr="FFFFFF">
-                <a:lumMod val="50000"/>
-              </a:sysClr>
-            </a:solidFill>
-            <a:ln w="9525" cap="flat" cmpd="sng" algn="ctr">
-              <a:noFill/>
-              <a:prstDash val="solid"/>
-              <a:headEnd type="none" w="med" len="med"/>
-              <a:tailEnd type="none" w="med" len="med"/>
-            </a:ln>
-            <a:effectLst>
-              <a:outerShdw blurRad="76200" dist="50800" dir="2700000" rotWithShape="0">
-                <a:srgbClr val="000000">
-                  <a:alpha val="30000"/>
-                </a:srgbClr>
-              </a:outerShdw>
-            </a:effectLst>
-            <a:extLst/>
-          </p:spPr>
-          <p:txBody>
-            <a:bodyPr vert="horz" wrap="none" lIns="91440" tIns="36000" rIns="91440" bIns="72000" numCol="1" rtlCol="0" anchor="ctr" anchorCtr="0" compatLnSpc="1">
-              <a:prstTxWarp prst="textNoShape">
-                <a:avLst/>
-              </a:prstTxWarp>
-              <a:noAutofit/>
-            </a:bodyPr>
-            <a:lstStyle/>
-            <a:p>
-              <a:pPr marL="0" marR="0" lvl="0" indent="0" algn="ctr" defTabSz="914400" eaLnBrk="1" fontAlgn="ctr" latinLnBrk="0" hangingPunct="1">
-                <a:lnSpc>
-                  <a:spcPct val="100000"/>
-                </a:lnSpc>
-                <a:spcBef>
-                  <a:spcPts val="0"/>
-                </a:spcBef>
-                <a:spcAft>
-                  <a:spcPts val="0"/>
-                </a:spcAft>
-                <a:buClrTx/>
-                <a:buSzTx/>
-                <a:buFontTx/>
-                <a:buNone/>
-                <a:tabLst/>
-                <a:defRPr/>
-              </a:pPr>
-              <a:r>
-                <a:rPr kumimoji="0" lang="en-US" altLang="ja-JP" sz="2000" b="1" i="0" u="none" strike="noStrike" kern="0" cap="none" spc="0" normalizeH="0" baseline="0" noProof="0" dirty="0">
-                  <a:ln>
-                    <a:noFill/>
-                  </a:ln>
-                  <a:effectLst/>
-                  <a:uLnTx/>
-                  <a:uFillTx/>
-                  <a:ea typeface="HG明朝E" panose="02020909000000000000" pitchFamily="17" charset="-128"/>
-                  <a:cs typeface="Arial" pitchFamily="34" charset="0"/>
-                </a:rPr>
-                <a:t>Thing A</a:t>
-              </a:r>
-            </a:p>
-          </p:txBody>
-        </p:sp>
         <p:cxnSp>
           <p:nvCxnSpPr>
             <p:cNvPr id="37" name="直線矢印コネクタ 36">
@@ -11637,6 +12174,9 @@
               <a:avLst/>
             </a:prstGeom>
             <a:ln>
+              <a:solidFill>
+                <a:srgbClr val="7F7F7F"/>
+              </a:solidFill>
               <a:tailEnd type="triangle"/>
             </a:ln>
           </p:spPr>
@@ -11680,6 +12220,9 @@
               <a:avLst/>
             </a:prstGeom>
             <a:ln>
+              <a:solidFill>
+                <a:srgbClr val="7F7F7F"/>
+              </a:solidFill>
               <a:tailEnd type="triangle"/>
             </a:ln>
           </p:spPr>
@@ -12972,154 +13515,8 @@
           </p:nvSpPr>
           <p:spPr>
             <a:xfrm rot="8569733">
-              <a:off x="8332125" y="2249670"/>
-              <a:ext cx="155565" cy="1144286"/>
-            </a:xfrm>
-            <a:prstGeom prst="downArrow">
-              <a:avLst>
-                <a:gd name="adj1" fmla="val 50000"/>
-                <a:gd name="adj2" fmla="val 50000"/>
-              </a:avLst>
-            </a:prstGeom>
-            <a:solidFill>
-              <a:sysClr val="window" lastClr="FFFFFF">
-                <a:lumMod val="75000"/>
-              </a:sysClr>
-            </a:solidFill>
-            <a:ln w="12700" cap="flat" cmpd="sng" algn="ctr">
-              <a:noFill/>
-              <a:prstDash val="solid"/>
-              <a:miter lim="800000"/>
-            </a:ln>
-            <a:effectLst/>
-          </p:spPr>
-          <p:txBody>
-            <a:bodyPr rtlCol="0" anchor="ctr"/>
-            <a:lstStyle/>
-            <a:p>
-              <a:pPr marL="0" marR="0" lvl="0" indent="0" algn="ctr" defTabSz="914400" eaLnBrk="1" fontAlgn="auto" latinLnBrk="0" hangingPunct="1">
-                <a:lnSpc>
-                  <a:spcPct val="100000"/>
-                </a:lnSpc>
-                <a:spcBef>
-                  <a:spcPts val="0"/>
-                </a:spcBef>
-                <a:spcAft>
-                  <a:spcPts val="0"/>
-                </a:spcAft>
-                <a:buClrTx/>
-                <a:buSzTx/>
-                <a:buFontTx/>
-                <a:buNone/>
-                <a:tabLst/>
-                <a:defRPr/>
-              </a:pPr>
-              <a:endParaRPr kumimoji="0" lang="en-US" sz="1800" b="0" i="0" u="none" strike="noStrike" kern="0" cap="none" spc="0" normalizeH="0" baseline="0" noProof="0">
-                <a:ln>
-                  <a:noFill/>
-                </a:ln>
-                <a:solidFill>
-                  <a:prstClr val="white"/>
-                </a:solidFill>
-                <a:effectLst/>
-                <a:uLnTx/>
-                <a:uFillTx/>
-                <a:latin typeface="Calibri" panose="020F0502020204030204"/>
-                <a:ea typeface="+mn-ea"/>
-                <a:cs typeface="Arial" pitchFamily="34" charset="0"/>
-              </a:endParaRPr>
-            </a:p>
-          </p:txBody>
-        </p:sp>
-        <p:sp>
-          <p:nvSpPr>
-            <p:cNvPr id="89" name="Down Arrow 40">
-              <a:extLst>
-                <a:ext uri="{FF2B5EF4-FFF2-40B4-BE49-F238E27FC236}">
-                  <a16:creationId xmlns:a16="http://schemas.microsoft.com/office/drawing/2014/main" id="{C3343050-8CC9-4B75-B876-F2F33E35216C}"/>
-                </a:ext>
-              </a:extLst>
-            </p:cNvPr>
-            <p:cNvSpPr/>
-            <p:nvPr/>
-          </p:nvSpPr>
-          <p:spPr>
-            <a:xfrm rot="8569733">
-              <a:off x="8351217" y="3278608"/>
-              <a:ext cx="155565" cy="1144286"/>
-            </a:xfrm>
-            <a:prstGeom prst="downArrow">
-              <a:avLst>
-                <a:gd name="adj1" fmla="val 50000"/>
-                <a:gd name="adj2" fmla="val 50000"/>
-              </a:avLst>
-            </a:prstGeom>
-            <a:solidFill>
-              <a:sysClr val="window" lastClr="FFFFFF">
-                <a:lumMod val="75000"/>
-              </a:sysClr>
-            </a:solidFill>
-            <a:ln w="12700" cap="flat" cmpd="sng" algn="ctr">
-              <a:noFill/>
-              <a:prstDash val="solid"/>
-              <a:miter lim="800000"/>
-            </a:ln>
-            <a:effectLst/>
-          </p:spPr>
-          <p:txBody>
-            <a:bodyPr rtlCol="0" anchor="ctr"/>
-            <a:lstStyle/>
-            <a:p>
-              <a:pPr marL="0" marR="0" lvl="0" indent="0" algn="ctr" defTabSz="914400" eaLnBrk="1" fontAlgn="auto" latinLnBrk="0" hangingPunct="1">
-                <a:lnSpc>
-                  <a:spcPct val="100000"/>
-                </a:lnSpc>
-                <a:spcBef>
-                  <a:spcPts val="0"/>
-                </a:spcBef>
-                <a:spcAft>
-                  <a:spcPts val="0"/>
-                </a:spcAft>
-                <a:buClrTx/>
-                <a:buSzTx/>
-                <a:buFontTx/>
-                <a:buNone/>
-                <a:tabLst/>
-                <a:defRPr/>
-              </a:pPr>
-              <a:endParaRPr kumimoji="0" lang="en-US" sz="1800" b="0" i="0" u="none" strike="noStrike" kern="0" cap="none" spc="0" normalizeH="0" baseline="0" noProof="0">
-                <a:ln>
-                  <a:noFill/>
-                </a:ln>
-                <a:solidFill>
-                  <a:prstClr val="white"/>
-                </a:solidFill>
-                <a:effectLst/>
-                <a:uLnTx/>
-                <a:uFillTx/>
-                <a:latin typeface="Calibri" panose="020F0502020204030204"/>
-                <a:ea typeface="+mn-ea"/>
-                <a:cs typeface="Arial" pitchFamily="34" charset="0"/>
-              </a:endParaRPr>
-            </a:p>
-          </p:txBody>
-        </p:sp>
-        <p:sp>
-          <p:nvSpPr>
-            <p:cNvPr id="90" name="Down Arrow 40">
-              <a:extLst>
-                <a:ext uri="{FF2B5EF4-FFF2-40B4-BE49-F238E27FC236}">
-                  <a16:creationId xmlns:a16="http://schemas.microsoft.com/office/drawing/2014/main" id="{37BF7EAC-3889-4E74-BC3F-68E89327D804}"/>
-                </a:ext>
-              </a:extLst>
-            </p:cNvPr>
-            <p:cNvSpPr/>
-            <p:nvPr/>
-          </p:nvSpPr>
-          <p:spPr>
-            <a:xfrm rot="8569733">
-              <a:off x="4991997" y="2788665"/>
-              <a:ext cx="155565" cy="1144286"/>
+              <a:off x="8337752" y="2300555"/>
+              <a:ext cx="324000" cy="1144286"/>
             </a:xfrm>
             <a:prstGeom prst="downArrow">
               <a:avLst>
@@ -13338,8 +13735,8 @@
           </p:nvSpPr>
           <p:spPr>
             <a:xfrm rot="13030267" flipV="1">
-              <a:off x="3582471" y="2787016"/>
-              <a:ext cx="155565" cy="1144286"/>
+              <a:off x="3588098" y="2736131"/>
+              <a:ext cx="324000" cy="1144286"/>
             </a:xfrm>
             <a:prstGeom prst="downArrow">
               <a:avLst>
@@ -13485,8 +13882,8 @@
           </p:nvCxnSpPr>
           <p:spPr>
             <a:xfrm flipV="1">
-              <a:off x="3473489" y="3862059"/>
-              <a:ext cx="5245022" cy="472630"/>
+              <a:off x="3473489" y="3704265"/>
+              <a:ext cx="5245022" cy="630424"/>
             </a:xfrm>
             <a:prstGeom prst="straightConnector1">
               <a:avLst/>
@@ -13521,7 +13918,7 @@
           <p:spPr>
             <a:xfrm>
               <a:off x="3487996" y="4339137"/>
-              <a:ext cx="5230515" cy="501220"/>
+              <a:ext cx="5230515" cy="398640"/>
             </a:xfrm>
             <a:prstGeom prst="straightConnector1">
               <a:avLst/>
@@ -13539,6 +13936,310 @@
             <a:effectLst/>
           </p:spPr>
         </p:cxnSp>
+        <p:sp>
+          <p:nvSpPr>
+            <p:cNvPr id="47" name="テキスト ボックス 46">
+              <a:extLst>
+                <a:ext uri="{FF2B5EF4-FFF2-40B4-BE49-F238E27FC236}">
+                  <a16:creationId xmlns:a16="http://schemas.microsoft.com/office/drawing/2014/main" id="{286BA5D7-ADFF-4092-9C52-8D7D5BBA0127}"/>
+                </a:ext>
+              </a:extLst>
+            </p:cNvPr>
+            <p:cNvSpPr txBox="1"/>
+            <p:nvPr/>
+          </p:nvSpPr>
+          <p:spPr>
+            <a:xfrm>
+              <a:off x="6832109" y="4042940"/>
+              <a:ext cx="974947" cy="400110"/>
+            </a:xfrm>
+            <a:prstGeom prst="rect">
+              <a:avLst/>
+            </a:prstGeom>
+            <a:noFill/>
+          </p:spPr>
+          <p:txBody>
+            <a:bodyPr wrap="none" rtlCol="0">
+              <a:spAutoFit/>
+            </a:bodyPr>
+            <a:lstStyle/>
+            <a:p>
+              <a:pPr algn="ctr"/>
+              <a:r>
+                <a:rPr kumimoji="1" lang="en-US" altLang="ja-JP" sz="2000" dirty="0"/>
+                <a:t>Related</a:t>
+              </a:r>
+              <a:endParaRPr kumimoji="1" lang="ja-JP" altLang="en-US" dirty="0"/>
+            </a:p>
+          </p:txBody>
+        </p:sp>
+        <p:sp>
+          <p:nvSpPr>
+            <p:cNvPr id="4" name="角丸四角形 6">
+              <a:extLst>
+                <a:ext uri="{FF2B5EF4-FFF2-40B4-BE49-F238E27FC236}">
+                  <a16:creationId xmlns:a16="http://schemas.microsoft.com/office/drawing/2014/main" id="{529EACCC-C218-4181-AB85-88A152772189}"/>
+                </a:ext>
+              </a:extLst>
+            </p:cNvPr>
+            <p:cNvSpPr/>
+            <p:nvPr/>
+          </p:nvSpPr>
+          <p:spPr bwMode="auto">
+            <a:xfrm>
+              <a:off x="5377602" y="3747353"/>
+              <a:ext cx="1440000" cy="720000"/>
+            </a:xfrm>
+            <a:prstGeom prst="roundRect">
+              <a:avLst>
+                <a:gd name="adj" fmla="val 5032"/>
+              </a:avLst>
+            </a:prstGeom>
+            <a:solidFill>
+              <a:sysClr val="window" lastClr="FFFFFF">
+                <a:lumMod val="50000"/>
+              </a:sysClr>
+            </a:solidFill>
+            <a:ln w="9525" cap="flat" cmpd="sng" algn="ctr">
+              <a:noFill/>
+              <a:prstDash val="solid"/>
+              <a:headEnd type="none" w="med" len="med"/>
+              <a:tailEnd type="none" w="med" len="med"/>
+            </a:ln>
+            <a:effectLst>
+              <a:outerShdw blurRad="76200" dist="50800" dir="2700000" rotWithShape="0">
+                <a:srgbClr val="000000">
+                  <a:alpha val="30000"/>
+                </a:srgbClr>
+              </a:outerShdw>
+            </a:effectLst>
+            <a:extLst/>
+          </p:spPr>
+          <p:txBody>
+            <a:bodyPr vert="horz" wrap="none" lIns="91440" tIns="36000" rIns="91440" bIns="72000" numCol="1" rtlCol="0" anchor="ctr" anchorCtr="0" compatLnSpc="1">
+              <a:prstTxWarp prst="textNoShape">
+                <a:avLst/>
+              </a:prstTxWarp>
+              <a:noAutofit/>
+            </a:bodyPr>
+            <a:lstStyle/>
+            <a:p>
+              <a:pPr marL="0" marR="0" lvl="0" indent="0" algn="ctr" defTabSz="914400" eaLnBrk="1" fontAlgn="ctr" latinLnBrk="0" hangingPunct="1">
+                <a:lnSpc>
+                  <a:spcPct val="100000"/>
+                </a:lnSpc>
+                <a:spcBef>
+                  <a:spcPts val="0"/>
+                </a:spcBef>
+                <a:spcAft>
+                  <a:spcPts val="0"/>
+                </a:spcAft>
+                <a:buClrTx/>
+                <a:buSzTx/>
+                <a:buFontTx/>
+                <a:buNone/>
+                <a:tabLst/>
+                <a:defRPr/>
+              </a:pPr>
+              <a:r>
+                <a:rPr kumimoji="0" lang="en-US" altLang="ja-JP" sz="2000" b="1" i="0" u="none" strike="noStrike" kern="0" cap="none" spc="0" normalizeH="0" baseline="0" noProof="0" dirty="0">
+                  <a:ln>
+                    <a:noFill/>
+                  </a:ln>
+                  <a:effectLst/>
+                  <a:uLnTx/>
+                  <a:uFillTx/>
+                  <a:ea typeface="HG明朝E" panose="02020909000000000000" pitchFamily="17" charset="-128"/>
+                  <a:cs typeface="Arial" pitchFamily="34" charset="0"/>
+                </a:rPr>
+                <a:t>Thing A</a:t>
+              </a:r>
+            </a:p>
+          </p:txBody>
+        </p:sp>
+        <p:sp>
+          <p:nvSpPr>
+            <p:cNvPr id="90" name="Down Arrow 40">
+              <a:extLst>
+                <a:ext uri="{FF2B5EF4-FFF2-40B4-BE49-F238E27FC236}">
+                  <a16:creationId xmlns:a16="http://schemas.microsoft.com/office/drawing/2014/main" id="{37BF7EAC-3889-4E74-BC3F-68E89327D804}"/>
+                </a:ext>
+              </a:extLst>
+            </p:cNvPr>
+            <p:cNvSpPr/>
+            <p:nvPr/>
+          </p:nvSpPr>
+          <p:spPr>
+            <a:xfrm rot="8569733">
+              <a:off x="4997624" y="2839550"/>
+              <a:ext cx="324000" cy="1144286"/>
+            </a:xfrm>
+            <a:prstGeom prst="downArrow">
+              <a:avLst>
+                <a:gd name="adj1" fmla="val 50000"/>
+                <a:gd name="adj2" fmla="val 50000"/>
+              </a:avLst>
+            </a:prstGeom>
+            <a:solidFill>
+              <a:sysClr val="window" lastClr="FFFFFF">
+                <a:lumMod val="75000"/>
+              </a:sysClr>
+            </a:solidFill>
+            <a:ln w="12700" cap="flat" cmpd="sng" algn="ctr">
+              <a:noFill/>
+              <a:prstDash val="solid"/>
+              <a:miter lim="800000"/>
+            </a:ln>
+            <a:effectLst/>
+          </p:spPr>
+          <p:txBody>
+            <a:bodyPr rtlCol="0" anchor="ctr"/>
+            <a:lstStyle/>
+            <a:p>
+              <a:pPr marL="0" marR="0" lvl="0" indent="0" algn="ctr" defTabSz="914400" eaLnBrk="1" fontAlgn="auto" latinLnBrk="0" hangingPunct="1">
+                <a:lnSpc>
+                  <a:spcPct val="100000"/>
+                </a:lnSpc>
+                <a:spcBef>
+                  <a:spcPts val="0"/>
+                </a:spcBef>
+                <a:spcAft>
+                  <a:spcPts val="0"/>
+                </a:spcAft>
+                <a:buClrTx/>
+                <a:buSzTx/>
+                <a:buFontTx/>
+                <a:buNone/>
+                <a:tabLst/>
+                <a:defRPr/>
+              </a:pPr>
+              <a:endParaRPr kumimoji="0" lang="en-US" sz="1800" b="0" i="0" u="none" strike="noStrike" kern="0" cap="none" spc="0" normalizeH="0" baseline="0" noProof="0">
+                <a:ln>
+                  <a:noFill/>
+                </a:ln>
+                <a:solidFill>
+                  <a:prstClr val="white"/>
+                </a:solidFill>
+                <a:effectLst/>
+                <a:uLnTx/>
+                <a:uFillTx/>
+                <a:latin typeface="Calibri" panose="020F0502020204030204"/>
+                <a:ea typeface="+mn-ea"/>
+                <a:cs typeface="Arial" pitchFamily="34" charset="0"/>
+              </a:endParaRPr>
+            </a:p>
+          </p:txBody>
+        </p:sp>
+        <p:sp>
+          <p:nvSpPr>
+            <p:cNvPr id="48" name="テキスト ボックス 47">
+              <a:extLst>
+                <a:ext uri="{FF2B5EF4-FFF2-40B4-BE49-F238E27FC236}">
+                  <a16:creationId xmlns:a16="http://schemas.microsoft.com/office/drawing/2014/main" id="{4BAE56B0-F843-4AB5-AB04-C7C6372F2AF5}"/>
+                </a:ext>
+              </a:extLst>
+            </p:cNvPr>
+            <p:cNvSpPr txBox="1"/>
+            <p:nvPr/>
+          </p:nvSpPr>
+          <p:spPr>
+            <a:xfrm>
+              <a:off x="4016684" y="3811821"/>
+              <a:ext cx="996619" cy="400110"/>
+            </a:xfrm>
+            <a:prstGeom prst="rect">
+              <a:avLst/>
+            </a:prstGeom>
+            <a:noFill/>
+          </p:spPr>
+          <p:txBody>
+            <a:bodyPr wrap="none" rtlCol="0">
+              <a:spAutoFit/>
+            </a:bodyPr>
+            <a:lstStyle/>
+            <a:p>
+              <a:pPr algn="ctr"/>
+              <a:r>
+                <a:rPr kumimoji="1" lang="en-US" altLang="ja-JP" sz="2000" dirty="0"/>
+                <a:t>Interact</a:t>
+              </a:r>
+              <a:endParaRPr kumimoji="1" lang="ja-JP" altLang="en-US" dirty="0"/>
+            </a:p>
+          </p:txBody>
+        </p:sp>
+        <p:sp>
+          <p:nvSpPr>
+            <p:cNvPr id="89" name="Down Arrow 40">
+              <a:extLst>
+                <a:ext uri="{FF2B5EF4-FFF2-40B4-BE49-F238E27FC236}">
+                  <a16:creationId xmlns:a16="http://schemas.microsoft.com/office/drawing/2014/main" id="{C3343050-8CC9-4B75-B876-F2F33E35216C}"/>
+                </a:ext>
+              </a:extLst>
+            </p:cNvPr>
+            <p:cNvSpPr/>
+            <p:nvPr/>
+          </p:nvSpPr>
+          <p:spPr>
+            <a:xfrm rot="8569733">
+              <a:off x="8356844" y="3329493"/>
+              <a:ext cx="324000" cy="1144286"/>
+            </a:xfrm>
+            <a:prstGeom prst="downArrow">
+              <a:avLst>
+                <a:gd name="adj1" fmla="val 50000"/>
+                <a:gd name="adj2" fmla="val 50000"/>
+              </a:avLst>
+            </a:prstGeom>
+            <a:solidFill>
+              <a:sysClr val="window" lastClr="FFFFFF">
+                <a:lumMod val="75000"/>
+              </a:sysClr>
+            </a:solidFill>
+            <a:ln w="12700" cap="flat" cmpd="sng" algn="ctr">
+              <a:noFill/>
+              <a:prstDash val="solid"/>
+              <a:miter lim="800000"/>
+            </a:ln>
+            <a:effectLst/>
+          </p:spPr>
+          <p:txBody>
+            <a:bodyPr rtlCol="0" anchor="ctr"/>
+            <a:lstStyle/>
+            <a:p>
+              <a:pPr marL="0" marR="0" lvl="0" indent="0" algn="ctr" defTabSz="914400" eaLnBrk="1" fontAlgn="auto" latinLnBrk="0" hangingPunct="1">
+                <a:lnSpc>
+                  <a:spcPct val="100000"/>
+                </a:lnSpc>
+                <a:spcBef>
+                  <a:spcPts val="0"/>
+                </a:spcBef>
+                <a:spcAft>
+                  <a:spcPts val="0"/>
+                </a:spcAft>
+                <a:buClrTx/>
+                <a:buSzTx/>
+                <a:buFontTx/>
+                <a:buNone/>
+                <a:tabLst/>
+                <a:defRPr/>
+              </a:pPr>
+              <a:endParaRPr kumimoji="0" lang="en-US" sz="1800" b="0" i="0" u="none" strike="noStrike" kern="0" cap="none" spc="0" normalizeH="0" baseline="0" noProof="0">
+                <a:ln>
+                  <a:noFill/>
+                </a:ln>
+                <a:solidFill>
+                  <a:prstClr val="white"/>
+                </a:solidFill>
+                <a:effectLst/>
+                <a:uLnTx/>
+                <a:uFillTx/>
+                <a:latin typeface="Calibri" panose="020F0502020204030204"/>
+                <a:ea typeface="+mn-ea"/>
+                <a:cs typeface="Arial" pitchFamily="34" charset="0"/>
+              </a:endParaRPr>
+            </a:p>
+          </p:txBody>
+        </p:sp>
       </p:grpSp>
     </p:spTree>
     <p:extLst>
@@ -13624,10 +14325,10 @@
       </p:sp>
       <p:grpSp>
         <p:nvGrpSpPr>
-          <p:cNvPr id="58" name="グループ化 57">
+          <p:cNvPr id="2" name="グループ化 1">
             <a:extLst>
               <a:ext uri="{FF2B5EF4-FFF2-40B4-BE49-F238E27FC236}">
-                <a16:creationId xmlns:a16="http://schemas.microsoft.com/office/drawing/2014/main" id="{8409BA8A-037E-4A7D-B1D1-F040C893EFD2}"/>
+                <a16:creationId xmlns:a16="http://schemas.microsoft.com/office/drawing/2014/main" id="{9F5C8A22-7526-41CB-8FA7-321A136F25CF}"/>
               </a:ext>
             </a:extLst>
           </p:cNvPr>
@@ -13638,7 +14339,7 @@
           <a:xfrm>
             <a:off x="1053280" y="2469401"/>
             <a:ext cx="10085441" cy="1919198"/>
-            <a:chOff x="818821" y="2487636"/>
+            <a:chOff x="1053280" y="2469401"/>
             <a:chExt cx="10085441" cy="1919198"/>
           </a:xfrm>
         </p:grpSpPr>
@@ -13656,7 +14357,7 @@
           </p:nvSpPr>
           <p:spPr bwMode="auto">
             <a:xfrm>
-              <a:off x="9248847" y="2487636"/>
+              <a:off x="9483306" y="2469401"/>
               <a:ext cx="1655415" cy="858501"/>
             </a:xfrm>
             <a:prstGeom prst="roundRect">
@@ -13740,7 +14441,7 @@
           </p:nvSpPr>
           <p:spPr bwMode="auto">
             <a:xfrm>
-              <a:off x="818821" y="2971468"/>
+              <a:off x="1053280" y="2953233"/>
               <a:ext cx="1655415" cy="858501"/>
             </a:xfrm>
             <a:prstGeom prst="roundRect">
@@ -13827,7 +14528,7 @@
           </p:nvSpPr>
           <p:spPr>
             <a:xfrm rot="5400000">
-              <a:off x="2649367" y="2748759"/>
+              <a:off x="2883826" y="2730524"/>
               <a:ext cx="407233" cy="754467"/>
             </a:xfrm>
             <a:prstGeom prst="downArrow">
@@ -13902,7 +14603,7 @@
           </p:nvCxnSpPr>
           <p:spPr>
             <a:xfrm>
-              <a:off x="2474236" y="3637669"/>
+              <a:off x="2708695" y="3619434"/>
               <a:ext cx="2559598" cy="0"/>
             </a:xfrm>
             <a:prstGeom prst="straightConnector1">
@@ -13935,7 +14636,7 @@
           </p:nvSpPr>
           <p:spPr bwMode="auto">
             <a:xfrm>
-              <a:off x="5033834" y="2938583"/>
+              <a:off x="5268293" y="2920348"/>
               <a:ext cx="1655415" cy="858501"/>
             </a:xfrm>
             <a:prstGeom prst="roundRect">
@@ -14019,7 +14720,7 @@
           </p:nvGrpSpPr>
           <p:grpSpPr>
             <a:xfrm>
-              <a:off x="3230217" y="2888744"/>
+              <a:off x="3464676" y="2870509"/>
               <a:ext cx="1005010" cy="474496"/>
               <a:chOff x="5420778" y="1760845"/>
               <a:chExt cx="1504967" cy="707886"/>
@@ -14439,7 +15140,7 @@
           </p:nvSpPr>
           <p:spPr>
             <a:xfrm rot="5400000">
-              <a:off x="4379962" y="2743270"/>
+              <a:off x="4614421" y="2725035"/>
               <a:ext cx="407233" cy="754467"/>
             </a:xfrm>
             <a:prstGeom prst="downArrow">
@@ -14512,7 +15213,7 @@
           </p:nvSpPr>
           <p:spPr bwMode="auto">
             <a:xfrm>
-              <a:off x="9248846" y="3498052"/>
+              <a:off x="9483305" y="3479817"/>
               <a:ext cx="1655415" cy="908782"/>
             </a:xfrm>
             <a:prstGeom prst="roundRect">
@@ -14598,7 +15299,7 @@
           </p:nvCxnSpPr>
           <p:spPr>
             <a:xfrm>
-              <a:off x="6667231" y="3621051"/>
+              <a:off x="6901690" y="3602816"/>
               <a:ext cx="2581615" cy="642836"/>
             </a:xfrm>
             <a:prstGeom prst="straightConnector1">
@@ -14633,7 +15334,7 @@
           </p:nvCxnSpPr>
           <p:spPr>
             <a:xfrm flipV="1">
-              <a:off x="6667231" y="3190852"/>
+              <a:off x="6901690" y="3172617"/>
               <a:ext cx="2559598" cy="426130"/>
             </a:xfrm>
             <a:prstGeom prst="straightConnector1">
@@ -14666,7 +15367,7 @@
           </p:nvGrpSpPr>
           <p:grpSpPr>
             <a:xfrm>
-              <a:off x="7535097" y="3400718"/>
+              <a:off x="7769556" y="3382483"/>
               <a:ext cx="1005010" cy="474496"/>
               <a:chOff x="5420778" y="1760845"/>
               <a:chExt cx="1504967" cy="707886"/>
@@ -15086,7 +15787,7 @@
           </p:nvGrpSpPr>
           <p:grpSpPr>
             <a:xfrm>
-              <a:off x="7537239" y="2622058"/>
+              <a:off x="7771698" y="2603823"/>
               <a:ext cx="1005010" cy="474496"/>
               <a:chOff x="5420778" y="1760845"/>
               <a:chExt cx="1504967" cy="707886"/>
@@ -15506,7 +16207,7 @@
           </p:nvGrpSpPr>
           <p:grpSpPr>
             <a:xfrm rot="20972942">
-              <a:off x="6721350" y="2692582"/>
+              <a:off x="6955809" y="2674347"/>
               <a:ext cx="2485062" cy="412722"/>
               <a:chOff x="6741767" y="2771272"/>
               <a:chExt cx="2485062" cy="412722"/>
@@ -15673,7 +16374,7 @@
           </p:nvGrpSpPr>
           <p:grpSpPr>
             <a:xfrm rot="684766">
-              <a:off x="6704499" y="3421808"/>
+              <a:off x="6938958" y="3403573"/>
               <a:ext cx="2485062" cy="412722"/>
               <a:chOff x="6741767" y="2771272"/>
               <a:chExt cx="2485062" cy="412722"/>
@@ -15826,6 +16527,80 @@
             </p:txBody>
           </p:sp>
         </p:grpSp>
+        <p:sp>
+          <p:nvSpPr>
+            <p:cNvPr id="60" name="テキスト ボックス 59">
+              <a:extLst>
+                <a:ext uri="{FF2B5EF4-FFF2-40B4-BE49-F238E27FC236}">
+                  <a16:creationId xmlns:a16="http://schemas.microsoft.com/office/drawing/2014/main" id="{54230993-C53A-4AD8-BCD5-3391C77C6AB5}"/>
+                </a:ext>
+              </a:extLst>
+            </p:cNvPr>
+            <p:cNvSpPr txBox="1"/>
+            <p:nvPr/>
+          </p:nvSpPr>
+          <p:spPr>
+            <a:xfrm>
+              <a:off x="3509578" y="3270595"/>
+              <a:ext cx="996619" cy="400110"/>
+            </a:xfrm>
+            <a:prstGeom prst="rect">
+              <a:avLst/>
+            </a:prstGeom>
+            <a:noFill/>
+          </p:spPr>
+          <p:txBody>
+            <a:bodyPr wrap="none" rtlCol="0">
+              <a:spAutoFit/>
+            </a:bodyPr>
+            <a:lstStyle/>
+            <a:p>
+              <a:pPr algn="ctr"/>
+              <a:r>
+                <a:rPr kumimoji="1" lang="en-US" altLang="ja-JP" sz="2000" dirty="0"/>
+                <a:t>Interact</a:t>
+              </a:r>
+              <a:endParaRPr kumimoji="1" lang="ja-JP" altLang="en-US" dirty="0"/>
+            </a:p>
+          </p:txBody>
+        </p:sp>
+        <p:sp>
+          <p:nvSpPr>
+            <p:cNvPr id="61" name="テキスト ボックス 60">
+              <a:extLst>
+                <a:ext uri="{FF2B5EF4-FFF2-40B4-BE49-F238E27FC236}">
+                  <a16:creationId xmlns:a16="http://schemas.microsoft.com/office/drawing/2014/main" id="{B8430410-D5E5-4D40-8B01-769E8D7DEA74}"/>
+                </a:ext>
+              </a:extLst>
+            </p:cNvPr>
+            <p:cNvSpPr txBox="1"/>
+            <p:nvPr/>
+          </p:nvSpPr>
+          <p:spPr>
+            <a:xfrm rot="21041987">
+              <a:off x="7802743" y="3012137"/>
+              <a:ext cx="1073854" cy="400110"/>
+            </a:xfrm>
+            <a:prstGeom prst="rect">
+              <a:avLst/>
+            </a:prstGeom>
+            <a:noFill/>
+          </p:spPr>
+          <p:txBody>
+            <a:bodyPr wrap="square" rtlCol="0">
+              <a:spAutoFit/>
+            </a:bodyPr>
+            <a:lstStyle/>
+            <a:p>
+              <a:pPr algn="ctr"/>
+              <a:r>
+                <a:rPr kumimoji="1" lang="en-US" altLang="ja-JP" sz="2000" dirty="0"/>
+                <a:t>Interact</a:t>
+              </a:r>
+              <a:endParaRPr kumimoji="1" lang="ja-JP" altLang="en-US" dirty="0"/>
+            </a:p>
+          </p:txBody>
+        </p:sp>
       </p:grpSp>
     </p:spTree>
     <p:extLst>

</xml_diff>